<commit_message>
Add the running *bat file for windows.
</commit_message>
<xml_diff>
--- a/doc/SingtelIOT_Progress_13_05_2019_LiuYuancheng - Copy.pptx
+++ b/doc/SingtelIOT_Progress_13_05_2019_LiuYuancheng - Copy.pptx
@@ -906,10 +906,6 @@
             <a:rPr lang="en-US" sz="1400" b="1" dirty="0" smtClean="0"/>
             <a:t>Week6</a:t>
           </a:r>
-          <a:r>
-            <a:rPr lang="en-US" sz="1400" b="1" dirty="0" smtClean="0"/>
-            <a:t/>
-          </a:r>
           <a:br>
             <a:rPr lang="en-US" sz="1400" b="1" dirty="0" smtClean="0"/>
           </a:br>
@@ -917,7 +913,6 @@
             <a:rPr lang="en-US" sz="1400" b="1" dirty="0" smtClean="0"/>
             <a:t> Main the basic client + server</a:t>
           </a:r>
-          <a:endParaRPr lang="en-US" sz="1400" b="1" dirty="0" smtClean="0"/>
         </a:p>
       </dgm:t>
     </dgm:pt>
@@ -952,9 +947,10 @@
         <a:p>
           <a:pPr algn="l"/>
           <a:r>
-            <a:rPr lang="en-US" b="1" dirty="0" smtClean="0"/>
-            <a:t>Week5</a:t>
+            <a:rPr lang="en-US" b="1" smtClean="0"/>
+            <a:t>Week7</a:t>
           </a:r>
+          <a:endParaRPr lang="en-US" b="1" dirty="0" smtClean="0"/>
         </a:p>
         <a:p>
           <a:pPr algn="l"/>
@@ -962,7 +958,6 @@
             <a:rPr lang="en-US" b="1" dirty="0" smtClean="0"/>
             <a:t>DB + Optimize code+ comm </a:t>
           </a:r>
-          <a:endParaRPr lang="en-US" b="1" dirty="0" smtClean="0"/>
         </a:p>
       </dgm:t>
     </dgm:pt>
@@ -1189,10 +1184,6 @@
             <a:rPr lang="en-US" sz="1400" b="1" kern="1200" dirty="0" smtClean="0"/>
             <a:t>Week6</a:t>
           </a:r>
-          <a:r>
-            <a:rPr lang="en-US" sz="1400" b="1" kern="1200" dirty="0" smtClean="0"/>
-            <a:t/>
-          </a:r>
           <a:br>
             <a:rPr lang="en-US" sz="1400" b="1" kern="1200" dirty="0" smtClean="0"/>
           </a:br>
@@ -1200,7 +1191,6 @@
             <a:rPr lang="en-US" sz="1400" b="1" kern="1200" dirty="0" smtClean="0"/>
             <a:t> Main the basic client + server</a:t>
           </a:r>
-          <a:endParaRPr lang="en-US" sz="1400" b="1" kern="1200" dirty="0" smtClean="0"/>
         </a:p>
       </dsp:txBody>
       <dsp:txXfrm>
@@ -1274,9 +1264,10 @@
             </a:spcAft>
           </a:pPr>
           <a:r>
-            <a:rPr lang="en-US" sz="1400" b="1" kern="1200" dirty="0" smtClean="0"/>
-            <a:t>Week5</a:t>
+            <a:rPr lang="en-US" sz="1400" b="1" kern="1200" smtClean="0"/>
+            <a:t>Week7</a:t>
           </a:r>
+          <a:endParaRPr lang="en-US" sz="1400" b="1" kern="1200" dirty="0" smtClean="0"/>
         </a:p>
         <a:p>
           <a:pPr lvl="0" algn="l" defTabSz="622300">
@@ -1294,7 +1285,6 @@
             <a:rPr lang="en-US" sz="1400" b="1" kern="1200" dirty="0" smtClean="0"/>
             <a:t>DB + Optimize code+ comm </a:t>
           </a:r>
-          <a:endParaRPr lang="en-US" sz="1400" b="1" kern="1200" dirty="0" smtClean="0"/>
         </a:p>
       </dsp:txBody>
       <dsp:txXfrm>
@@ -6854,15 +6844,7 @@
                             <a:schemeClr val="tx2"/>
                           </a:solidFill>
                         </a:rPr>
-                        <a:t>Firmware Sign program </a:t>
-                      </a:r>
-                      <a:r>
-                        <a:rPr lang="en-US" sz="1200" b="1" dirty="0" smtClean="0">
-                          <a:solidFill>
-                            <a:schemeClr val="tx2"/>
-                          </a:solidFill>
-                        </a:rPr>
-                        <a:t>user</a:t>
+                        <a:t>Firmware Sign program user</a:t>
                       </a:r>
                       <a:r>
                         <a:rPr lang="en-US" sz="1200" b="1" baseline="0" dirty="0" smtClean="0">
@@ -6965,15 +6947,7 @@
                             <a:schemeClr val="tx2"/>
                           </a:solidFill>
                         </a:rPr>
-                        <a:t>Firmware </a:t>
-                      </a:r>
-                      <a:r>
-                        <a:rPr lang="en-US" sz="1200" b="1" dirty="0" smtClean="0">
-                          <a:solidFill>
-                            <a:schemeClr val="tx2"/>
-                          </a:solidFill>
-                        </a:rPr>
-                        <a:t>selection +</a:t>
+                        <a:t>Firmware selection +</a:t>
                       </a:r>
                       <a:r>
                         <a:rPr lang="en-US" sz="1200" b="1" baseline="0" dirty="0" smtClean="0">
@@ -6981,31 +6955,7 @@
                             <a:schemeClr val="tx2"/>
                           </a:solidFill>
                         </a:rPr>
-                        <a:t> Firmware SWATT </a:t>
-                      </a:r>
-                      <a:r>
-                        <a:rPr lang="en-US" sz="1200" b="1" baseline="0" dirty="0" smtClean="0">
-                          <a:solidFill>
-                            <a:schemeClr val="tx2"/>
-                          </a:solidFill>
-                        </a:rPr>
-                        <a:t>value </a:t>
-                      </a:r>
-                      <a:r>
-                        <a:rPr lang="en-US" sz="1200" b="1" baseline="0" dirty="0" smtClean="0">
-                          <a:solidFill>
-                            <a:schemeClr val="tx2"/>
-                          </a:solidFill>
-                        </a:rPr>
-                        <a:t>calculation </a:t>
-                      </a:r>
-                      <a:r>
-                        <a:rPr lang="en-US" sz="1200" b="1" baseline="0" dirty="0" smtClean="0">
-                          <a:solidFill>
-                            <a:schemeClr val="tx2"/>
-                          </a:solidFill>
-                        </a:rPr>
-                        <a:t>based on server’s random challenge </a:t>
+                        <a:t> Firmware SWATT value calculation based on server’s random challenge </a:t>
                       </a:r>
                       <a:endParaRPr lang="en-US" sz="1200" dirty="0"/>
                     </a:p>
@@ -7055,15 +7005,7 @@
                             <a:schemeClr val="tx2"/>
                           </a:solidFill>
                         </a:rPr>
-                        <a:t> + communication data </a:t>
-                      </a:r>
-                      <a:r>
-                        <a:rPr lang="en-US" sz="1200" b="1" baseline="0" dirty="0" smtClean="0">
-                          <a:solidFill>
-                            <a:schemeClr val="tx2"/>
-                          </a:solidFill>
-                        </a:rPr>
-                        <a:t>packaging.(dump + load)</a:t>
+                        <a:t> + communication data packaging.(dump + load)</a:t>
                       </a:r>
                       <a:endParaRPr lang="en-US" sz="1200" b="1" dirty="0" smtClean="0">
                         <a:solidFill>
@@ -7277,15 +7219,7 @@
                             <a:schemeClr val="tx2"/>
                           </a:solidFill>
                         </a:rPr>
-                        <a:t>Firmware </a:t>
-                      </a:r>
-                      <a:r>
-                        <a:rPr lang="en-US" sz="1200" b="1" dirty="0" smtClean="0">
-                          <a:solidFill>
-                            <a:schemeClr val="tx2"/>
-                          </a:solidFill>
-                        </a:rPr>
-                        <a:t>sign</a:t>
+                        <a:t>Firmware sign</a:t>
                       </a:r>
                       <a:r>
                         <a:rPr lang="en-US" sz="1200" b="1" baseline="0" dirty="0" smtClean="0">
@@ -8013,23 +7947,7 @@
                   <a:schemeClr val="tx2"/>
                 </a:solidFill>
               </a:rPr>
-              <a:t>Dev Env: python </a:t>
-            </a:r>
-            <a:r>
-              <a:rPr lang="en-US" sz="1400" b="1" dirty="0" smtClean="0">
-                <a:solidFill>
-                  <a:schemeClr val="tx2"/>
-                </a:solidFill>
-              </a:rPr>
-              <a:t>3.7</a:t>
-            </a:r>
-            <a:r>
-              <a:rPr lang="en-US" sz="1400" b="1" dirty="0" smtClean="0">
-                <a:solidFill>
-                  <a:schemeClr val="tx2"/>
-                </a:solidFill>
-              </a:rPr>
-              <a:t> </a:t>
+              <a:t>Dev Env: python 3.7 </a:t>
             </a:r>
             <a:endParaRPr lang="en-US" sz="1400" b="1" dirty="0">
               <a:solidFill>
@@ -8050,11 +7968,6 @@
               </a:rPr>
               <a:t>Run Env: [2.7-3.7] </a:t>
             </a:r>
-            <a:endParaRPr lang="en-US" sz="1400" b="1" dirty="0" smtClean="0">
-              <a:solidFill>
-                <a:schemeClr val="tx2"/>
-              </a:solidFill>
-            </a:endParaRPr>
           </a:p>
           <a:p>
             <a:pPr marL="285750" indent="-285750">
@@ -8067,15 +7980,7 @@
                   <a:schemeClr val="tx2"/>
                 </a:solidFill>
               </a:rPr>
-              <a:t>Code </a:t>
-            </a:r>
-            <a:r>
-              <a:rPr lang="en-US" sz="1400" b="1" dirty="0" smtClean="0">
-                <a:solidFill>
-                  <a:schemeClr val="tx2"/>
-                </a:solidFill>
-              </a:rPr>
-              <a:t>and Document Format: PEP-8</a:t>
+              <a:t>Code and Document Format: PEP-8</a:t>
             </a:r>
           </a:p>
           <a:p>
@@ -8924,7 +8829,7 @@
           <p:nvPr>
             <p:extLst>
               <p:ext uri="{D42A27DB-BD31-4B8C-83A1-F6EECF244321}">
-                <p14:modId xmlns:p14="http://schemas.microsoft.com/office/powerpoint/2010/main" val="3865314022"/>
+                <p14:modId xmlns:p14="http://schemas.microsoft.com/office/powerpoint/2010/main" val="669563584"/>
               </p:ext>
             </p:extLst>
           </p:nvPr>
@@ -8987,11 +8892,6 @@
               </a:rPr>
               <a:t>Server . </a:t>
             </a:r>
-            <a:endParaRPr lang="en-US" sz="1400" b="1" dirty="0" smtClean="0">
-              <a:solidFill>
-                <a:schemeClr val="tx2"/>
-              </a:solidFill>
-            </a:endParaRPr>
           </a:p>
           <a:p>
             <a:pPr marL="285750" indent="-285750">
@@ -9004,21 +8904,8 @@
                   <a:schemeClr val="tx2"/>
                 </a:solidFill>
               </a:rPr>
-              <a:t>Certificate verify </a:t>
-            </a:r>
-            <a:r>
-              <a:rPr lang="en-US" sz="1400" b="1" dirty="0" smtClean="0">
-                <a:solidFill>
-                  <a:schemeClr val="tx2"/>
-                </a:solidFill>
-              </a:rPr>
-              <a:t>.</a:t>
-            </a:r>
-            <a:endParaRPr lang="en-US" sz="1400" b="1" dirty="0" smtClean="0">
-              <a:solidFill>
-                <a:schemeClr val="tx2"/>
-              </a:solidFill>
-            </a:endParaRPr>
+              <a:t>Certificate verify .</a:t>
+            </a:r>
           </a:p>
           <a:p>
             <a:pPr marL="285750" indent="-285750">
@@ -9106,15 +8993,7 @@
                   <a:schemeClr val="tx2"/>
                 </a:solidFill>
               </a:rPr>
-              <a:t>Data base</a:t>
-            </a:r>
-            <a:r>
-              <a:rPr lang="en-US" sz="1400" b="1" dirty="0" smtClean="0">
-                <a:solidFill>
-                  <a:schemeClr val="tx2"/>
-                </a:solidFill>
-              </a:rPr>
-              <a:t>.</a:t>
+              <a:t>Data base.</a:t>
             </a:r>
           </a:p>
           <a:p>
@@ -9170,15 +9049,7 @@
                   <a:schemeClr val="tx2"/>
                 </a:solidFill>
               </a:rPr>
-              <a:t>ByteIO</a:t>
-            </a:r>
-            <a:r>
-              <a:rPr lang="en-US" sz="1400" b="1" dirty="0" smtClean="0">
-                <a:solidFill>
-                  <a:schemeClr val="tx2"/>
-                </a:solidFill>
-              </a:rPr>
-              <a:t> for certificate(load in memory). </a:t>
+              <a:t>ByteIO for certificate(load in memory). </a:t>
             </a:r>
           </a:p>
           <a:p>
@@ -9234,23 +9105,7 @@
                   <a:schemeClr val="tx2"/>
                 </a:solidFill>
               </a:rPr>
-              <a:t>Code </a:t>
-            </a:r>
-            <a:r>
-              <a:rPr lang="en-US" sz="1400" b="1" dirty="0">
-                <a:solidFill>
-                  <a:schemeClr val="tx2"/>
-                </a:solidFill>
-              </a:rPr>
-              <a:t>modulize</a:t>
-            </a:r>
-            <a:r>
-              <a:rPr lang="en-US" sz="1400" b="1" dirty="0">
-                <a:solidFill>
-                  <a:schemeClr val="tx2"/>
-                </a:solidFill>
-              </a:rPr>
-              <a:t>. </a:t>
+              <a:t>Code modulize. </a:t>
             </a:r>
             <a:endParaRPr lang="en-US" sz="1400" b="1" dirty="0" smtClean="0">
               <a:solidFill>
@@ -9269,29 +9124,8 @@
                   <a:schemeClr val="tx2"/>
                 </a:solidFill>
               </a:rPr>
-              <a:t>Part of the </a:t>
-            </a:r>
-            <a:r>
-              <a:rPr lang="en-US" sz="1400" b="1" dirty="0" smtClean="0">
-                <a:solidFill>
-                  <a:schemeClr val="tx2"/>
-                </a:solidFill>
-              </a:rPr>
-              <a:t>testCase</a:t>
-            </a:r>
-            <a:r>
-              <a:rPr lang="en-US" sz="1400" b="1" dirty="0" smtClean="0">
-                <a:solidFill>
-                  <a:schemeClr val="tx2"/>
-                </a:solidFill>
-              </a:rPr>
-              <a:t>()</a:t>
-            </a:r>
-            <a:endParaRPr lang="en-US" sz="1400" b="1" dirty="0" smtClean="0">
-              <a:solidFill>
-                <a:schemeClr val="tx2"/>
-              </a:solidFill>
-            </a:endParaRPr>
+              <a:t>Part of the testCase()</a:t>
+            </a:r>
           </a:p>
           <a:p>
             <a:pPr marL="285750" indent="-285750">
@@ -9362,21 +9196,8 @@
                   <a:schemeClr val="tx2"/>
                 </a:solidFill>
               </a:rPr>
-              <a:t>testCase</a:t>
-            </a:r>
-            <a:r>
-              <a:rPr lang="en-US" sz="1400" b="1" dirty="0" smtClean="0">
-                <a:solidFill>
-                  <a:schemeClr val="tx2"/>
-                </a:solidFill>
-              </a:rPr>
-              <a:t>()</a:t>
-            </a:r>
-            <a:endParaRPr lang="en-US" sz="1400" b="1" dirty="0" smtClean="0">
-              <a:solidFill>
-                <a:schemeClr val="tx2"/>
-              </a:solidFill>
-            </a:endParaRPr>
+              <a:t>testCase()</a:t>
+            </a:r>
           </a:p>
           <a:p>
             <a:pPr marL="285750" indent="-285750">

</xml_diff>